<commit_message>
modelling/structure: fix typo in q-essay-objectDiagramsForClassDiagram.md
</commit_message>
<xml_diff>
--- a/diagrams/modelling/modellingStructures/classStructures/typicalClassStructure.pptx
+++ b/diagrams/modelling/modellingStructures/classStructures/typicalClassStructure.pptx
@@ -304,7 +304,7 @@
           <a:p>
             <a:fld id="{A0F86979-30DA-49EE-A740-32EBA6D2B7DE}" type="datetimeFigureOut">
               <a:rPr lang="en-SG" smtClean="0"/>
-              <a:t>30/8/2017</a:t>
+              <a:t>6/9/2017</a:t>
             </a:fld>
             <a:endParaRPr lang="en-SG"/>
           </a:p>
@@ -474,7 +474,7 @@
           <a:p>
             <a:fld id="{A0F86979-30DA-49EE-A740-32EBA6D2B7DE}" type="datetimeFigureOut">
               <a:rPr lang="en-SG" smtClean="0"/>
-              <a:t>30/8/2017</a:t>
+              <a:t>6/9/2017</a:t>
             </a:fld>
             <a:endParaRPr lang="en-SG"/>
           </a:p>
@@ -654,7 +654,7 @@
           <a:p>
             <a:fld id="{A0F86979-30DA-49EE-A740-32EBA6D2B7DE}" type="datetimeFigureOut">
               <a:rPr lang="en-SG" smtClean="0"/>
-              <a:t>30/8/2017</a:t>
+              <a:t>6/9/2017</a:t>
             </a:fld>
             <a:endParaRPr lang="en-SG"/>
           </a:p>
@@ -824,7 +824,7 @@
           <a:p>
             <a:fld id="{A0F86979-30DA-49EE-A740-32EBA6D2B7DE}" type="datetimeFigureOut">
               <a:rPr lang="en-SG" smtClean="0"/>
-              <a:t>30/8/2017</a:t>
+              <a:t>6/9/2017</a:t>
             </a:fld>
             <a:endParaRPr lang="en-SG"/>
           </a:p>
@@ -1070,7 +1070,7 @@
           <a:p>
             <a:fld id="{A0F86979-30DA-49EE-A740-32EBA6D2B7DE}" type="datetimeFigureOut">
               <a:rPr lang="en-SG" smtClean="0"/>
-              <a:t>30/8/2017</a:t>
+              <a:t>6/9/2017</a:t>
             </a:fld>
             <a:endParaRPr lang="en-SG"/>
           </a:p>
@@ -1358,7 +1358,7 @@
           <a:p>
             <a:fld id="{A0F86979-30DA-49EE-A740-32EBA6D2B7DE}" type="datetimeFigureOut">
               <a:rPr lang="en-SG" smtClean="0"/>
-              <a:t>30/8/2017</a:t>
+              <a:t>6/9/2017</a:t>
             </a:fld>
             <a:endParaRPr lang="en-SG"/>
           </a:p>
@@ -1780,7 +1780,7 @@
           <a:p>
             <a:fld id="{A0F86979-30DA-49EE-A740-32EBA6D2B7DE}" type="datetimeFigureOut">
               <a:rPr lang="en-SG" smtClean="0"/>
-              <a:t>30/8/2017</a:t>
+              <a:t>6/9/2017</a:t>
             </a:fld>
             <a:endParaRPr lang="en-SG"/>
           </a:p>
@@ -1898,7 +1898,7 @@
           <a:p>
             <a:fld id="{A0F86979-30DA-49EE-A740-32EBA6D2B7DE}" type="datetimeFigureOut">
               <a:rPr lang="en-SG" smtClean="0"/>
-              <a:t>30/8/2017</a:t>
+              <a:t>6/9/2017</a:t>
             </a:fld>
             <a:endParaRPr lang="en-SG"/>
           </a:p>
@@ -1993,7 +1993,7 @@
           <a:p>
             <a:fld id="{A0F86979-30DA-49EE-A740-32EBA6D2B7DE}" type="datetimeFigureOut">
               <a:rPr lang="en-SG" smtClean="0"/>
-              <a:t>30/8/2017</a:t>
+              <a:t>6/9/2017</a:t>
             </a:fld>
             <a:endParaRPr lang="en-SG"/>
           </a:p>
@@ -2270,7 +2270,7 @@
           <a:p>
             <a:fld id="{A0F86979-30DA-49EE-A740-32EBA6D2B7DE}" type="datetimeFigureOut">
               <a:rPr lang="en-SG" smtClean="0"/>
-              <a:t>30/8/2017</a:t>
+              <a:t>6/9/2017</a:t>
             </a:fld>
             <a:endParaRPr lang="en-SG"/>
           </a:p>
@@ -2523,7 +2523,7 @@
           <a:p>
             <a:fld id="{A0F86979-30DA-49EE-A740-32EBA6D2B7DE}" type="datetimeFigureOut">
               <a:rPr lang="en-SG" smtClean="0"/>
-              <a:t>30/8/2017</a:t>
+              <a:t>6/9/2017</a:t>
             </a:fld>
             <a:endParaRPr lang="en-SG"/>
           </a:p>
@@ -2736,7 +2736,7 @@
           <a:p>
             <a:fld id="{A0F86979-30DA-49EE-A740-32EBA6D2B7DE}" type="datetimeFigureOut">
               <a:rPr lang="en-SG" smtClean="0"/>
-              <a:t>30/8/2017</a:t>
+              <a:t>6/9/2017</a:t>
             </a:fld>
             <a:endParaRPr lang="en-SG"/>
           </a:p>
@@ -3347,13 +3347,8 @@
           <a:p>
             <a:r>
               <a:rPr lang="en-US" sz="1400" dirty="0" smtClean="0"/>
-              <a:t>- </a:t>
-            </a:r>
-            <a:r>
-              <a:rPr lang="en-US" sz="1400" dirty="0" smtClean="0"/>
-              <a:t>name: String</a:t>
-            </a:r>
-            <a:endParaRPr lang="en-US" sz="1400" dirty="0" smtClean="0"/>
+              <a:t>- name: String</a:t>
+            </a:r>
           </a:p>
         </p:txBody>
       </p:sp>
@@ -3404,7 +3399,6 @@
               <a:rPr lang="en-US" sz="1400" dirty="0" smtClean="0"/>
               <a:t>()</a:t>
             </a:r>
-            <a:endParaRPr lang="en-US" sz="1400" dirty="0" smtClean="0"/>
           </a:p>
         </p:txBody>
       </p:sp>
@@ -3416,10 +3410,10 @@
         </p:nvGrpSpPr>
         <p:grpSpPr>
           <a:xfrm>
-            <a:off x="2673252" y="2666074"/>
-            <a:ext cx="850180" cy="261610"/>
-            <a:chOff x="4817345" y="2084658"/>
-            <a:chExt cx="850180" cy="261610"/>
+            <a:off x="2602215" y="2639114"/>
+            <a:ext cx="994004" cy="307777"/>
+            <a:chOff x="4857993" y="2084658"/>
+            <a:chExt cx="994004" cy="307777"/>
           </a:xfrm>
         </p:grpSpPr>
         <p:sp>
@@ -3430,8 +3424,8 @@
           </p:nvSpPr>
           <p:spPr>
             <a:xfrm>
-              <a:off x="4857991" y="2084658"/>
-              <a:ext cx="809534" cy="261610"/>
+              <a:off x="4898639" y="2084658"/>
+              <a:ext cx="953358" cy="307777"/>
             </a:xfrm>
             <a:prstGeom prst="rect">
               <a:avLst/>
@@ -3445,10 +3439,10 @@
             <a:lstStyle/>
             <a:p>
               <a:r>
-                <a:rPr lang="en-US" sz="1100" dirty="0" smtClean="0"/>
+                <a:rPr lang="en-US" sz="1400" dirty="0" smtClean="0"/>
                 <a:t>paying for</a:t>
               </a:r>
-              <a:endParaRPr lang="en-SG" sz="1100" dirty="0"/>
+              <a:endParaRPr lang="en-SG" sz="1400" dirty="0"/>
             </a:p>
           </p:txBody>
         </p:sp>
@@ -3460,7 +3454,7 @@
           </p:nvSpPr>
           <p:spPr>
             <a:xfrm rot="16200000">
-              <a:off x="4800409" y="2174817"/>
+              <a:off x="4841057" y="2204909"/>
               <a:ext cx="115165" cy="81294"/>
             </a:xfrm>
             <a:prstGeom prst="triangle">
@@ -3764,7 +3758,7 @@
           <a:p>
             <a:r>
               <a:rPr lang="en-US" sz="1400" dirty="0" smtClean="0"/>
-              <a:t>Guardian</a:t>
+              <a:t>guardian</a:t>
             </a:r>
             <a:endParaRPr lang="en-SG" sz="1400" dirty="0"/>
           </a:p>
@@ -3778,8 +3772,8 @@
         </p:nvSpPr>
         <p:spPr>
           <a:xfrm>
-            <a:off x="3307408" y="2927684"/>
-            <a:ext cx="216024" cy="307777"/>
+            <a:off x="3172296" y="2927684"/>
+            <a:ext cx="463600" cy="307777"/>
           </a:xfrm>
           <a:prstGeom prst="rect">
             <a:avLst/>
@@ -3794,7 +3788,7 @@
           <a:p>
             <a:r>
               <a:rPr lang="en-US" sz="1400" dirty="0" smtClean="0"/>
-              <a:t>1</a:t>
+              <a:t>0..1</a:t>
             </a:r>
             <a:endParaRPr lang="en-SG" sz="1400" dirty="0"/>
           </a:p>

</xml_diff>